<commit_message>
Fix rep sample filtering
</commit_message>
<xml_diff>
--- a/src/assets/img/howto.pptx
+++ b/src/assets/img/howto.pptx
@@ -262,7 +262,7 @@
           <a:p>
             <a:fld id="{A3CB49A7-BE64-4F72-A376-EAC1987160C7}" type="datetimeFigureOut">
               <a:rPr lang="en-GB" smtClean="0"/>
-              <a:t>25/06/2020</a:t>
+              <a:t>25/09/2020</a:t>
             </a:fld>
             <a:endParaRPr lang="en-GB"/>
           </a:p>
@@ -462,7 +462,7 @@
           <a:p>
             <a:fld id="{A3CB49A7-BE64-4F72-A376-EAC1987160C7}" type="datetimeFigureOut">
               <a:rPr lang="en-GB" smtClean="0"/>
-              <a:t>25/06/2020</a:t>
+              <a:t>25/09/2020</a:t>
             </a:fld>
             <a:endParaRPr lang="en-GB"/>
           </a:p>
@@ -672,7 +672,7 @@
           <a:p>
             <a:fld id="{A3CB49A7-BE64-4F72-A376-EAC1987160C7}" type="datetimeFigureOut">
               <a:rPr lang="en-GB" smtClean="0"/>
-              <a:t>25/06/2020</a:t>
+              <a:t>25/09/2020</a:t>
             </a:fld>
             <a:endParaRPr lang="en-GB"/>
           </a:p>
@@ -872,7 +872,7 @@
           <a:p>
             <a:fld id="{A3CB49A7-BE64-4F72-A376-EAC1987160C7}" type="datetimeFigureOut">
               <a:rPr lang="en-GB" smtClean="0"/>
-              <a:t>25/06/2020</a:t>
+              <a:t>25/09/2020</a:t>
             </a:fld>
             <a:endParaRPr lang="en-GB"/>
           </a:p>
@@ -1148,7 +1148,7 @@
           <a:p>
             <a:fld id="{A3CB49A7-BE64-4F72-A376-EAC1987160C7}" type="datetimeFigureOut">
               <a:rPr lang="en-GB" smtClean="0"/>
-              <a:t>25/06/2020</a:t>
+              <a:t>25/09/2020</a:t>
             </a:fld>
             <a:endParaRPr lang="en-GB"/>
           </a:p>
@@ -1416,7 +1416,7 @@
           <a:p>
             <a:fld id="{A3CB49A7-BE64-4F72-A376-EAC1987160C7}" type="datetimeFigureOut">
               <a:rPr lang="en-GB" smtClean="0"/>
-              <a:t>25/06/2020</a:t>
+              <a:t>25/09/2020</a:t>
             </a:fld>
             <a:endParaRPr lang="en-GB"/>
           </a:p>
@@ -1831,7 +1831,7 @@
           <a:p>
             <a:fld id="{A3CB49A7-BE64-4F72-A376-EAC1987160C7}" type="datetimeFigureOut">
               <a:rPr lang="en-GB" smtClean="0"/>
-              <a:t>25/06/2020</a:t>
+              <a:t>25/09/2020</a:t>
             </a:fld>
             <a:endParaRPr lang="en-GB"/>
           </a:p>
@@ -1973,7 +1973,7 @@
           <a:p>
             <a:fld id="{A3CB49A7-BE64-4F72-A376-EAC1987160C7}" type="datetimeFigureOut">
               <a:rPr lang="en-GB" smtClean="0"/>
-              <a:t>25/06/2020</a:t>
+              <a:t>25/09/2020</a:t>
             </a:fld>
             <a:endParaRPr lang="en-GB"/>
           </a:p>
@@ -2086,7 +2086,7 @@
           <a:p>
             <a:fld id="{A3CB49A7-BE64-4F72-A376-EAC1987160C7}" type="datetimeFigureOut">
               <a:rPr lang="en-GB" smtClean="0"/>
-              <a:t>25/06/2020</a:t>
+              <a:t>25/09/2020</a:t>
             </a:fld>
             <a:endParaRPr lang="en-GB"/>
           </a:p>
@@ -2399,7 +2399,7 @@
           <a:p>
             <a:fld id="{A3CB49A7-BE64-4F72-A376-EAC1987160C7}" type="datetimeFigureOut">
               <a:rPr lang="en-GB" smtClean="0"/>
-              <a:t>25/06/2020</a:t>
+              <a:t>25/09/2020</a:t>
             </a:fld>
             <a:endParaRPr lang="en-GB"/>
           </a:p>
@@ -2688,7 +2688,7 @@
           <a:p>
             <a:fld id="{A3CB49A7-BE64-4F72-A376-EAC1987160C7}" type="datetimeFigureOut">
               <a:rPr lang="en-GB" smtClean="0"/>
-              <a:t>25/06/2020</a:t>
+              <a:t>25/09/2020</a:t>
             </a:fld>
             <a:endParaRPr lang="en-GB"/>
           </a:p>
@@ -2931,7 +2931,7 @@
           <a:p>
             <a:fld id="{A3CB49A7-BE64-4F72-A376-EAC1987160C7}" type="datetimeFigureOut">
               <a:rPr lang="en-GB" smtClean="0"/>
-              <a:t>25/06/2020</a:t>
+              <a:t>25/09/2020</a:t>
             </a:fld>
             <a:endParaRPr lang="en-GB"/>
           </a:p>
@@ -3350,10 +3350,10 @@
       </p:grpSpPr>
       <p:grpSp>
         <p:nvGrpSpPr>
-          <p:cNvPr id="44" name="Group 43">
-            <a:extLst>
-              <a:ext uri="{FF2B5EF4-FFF2-40B4-BE49-F238E27FC236}">
-                <a16:creationId xmlns:a16="http://schemas.microsoft.com/office/drawing/2014/main" id="{BBC1E9F6-969A-4FA3-825E-D3EE6528C59D}"/>
+          <p:cNvPr id="12" name="Group 11">
+            <a:extLst>
+              <a:ext uri="{FF2B5EF4-FFF2-40B4-BE49-F238E27FC236}">
+                <a16:creationId xmlns:a16="http://schemas.microsoft.com/office/drawing/2014/main" id="{E971476E-36A6-4220-BAEA-1C48AFEDF455}"/>
               </a:ext>
             </a:extLst>
           </p:cNvPr>
@@ -3362,18 +3362,688 @@
         </p:nvGrpSpPr>
         <p:grpSpPr>
           <a:xfrm>
-            <a:off x="0" y="679507"/>
+            <a:off x="117446" y="562061"/>
             <a:ext cx="12192000" cy="6098797"/>
-            <a:chOff x="0" y="637563"/>
+            <a:chOff x="117446" y="562061"/>
             <a:chExt cx="12192000" cy="6098797"/>
           </a:xfrm>
         </p:grpSpPr>
+        <p:grpSp>
+          <p:nvGrpSpPr>
+            <p:cNvPr id="44" name="Group 43">
+              <a:extLst>
+                <a:ext uri="{FF2B5EF4-FFF2-40B4-BE49-F238E27FC236}">
+                  <a16:creationId xmlns:a16="http://schemas.microsoft.com/office/drawing/2014/main" id="{BBC1E9F6-969A-4FA3-825E-D3EE6528C59D}"/>
+                </a:ext>
+              </a:extLst>
+            </p:cNvPr>
+            <p:cNvGrpSpPr/>
+            <p:nvPr/>
+          </p:nvGrpSpPr>
+          <p:grpSpPr>
+            <a:xfrm>
+              <a:off x="117446" y="562061"/>
+              <a:ext cx="12192000" cy="6098797"/>
+              <a:chOff x="0" y="637563"/>
+              <a:chExt cx="12192000" cy="6098797"/>
+            </a:xfrm>
+          </p:grpSpPr>
+          <p:sp>
+            <p:nvSpPr>
+              <p:cNvPr id="43" name="Rectangle 42">
+                <a:extLst>
+                  <a:ext uri="{FF2B5EF4-FFF2-40B4-BE49-F238E27FC236}">
+                    <a16:creationId xmlns:a16="http://schemas.microsoft.com/office/drawing/2014/main" id="{24D5AF3C-098C-48B9-83EF-DDE073836C58}"/>
+                  </a:ext>
+                </a:extLst>
+              </p:cNvPr>
+              <p:cNvSpPr/>
+              <p:nvPr/>
+            </p:nvSpPr>
+            <p:spPr>
+              <a:xfrm>
+                <a:off x="0" y="637563"/>
+                <a:ext cx="12192000" cy="6098797"/>
+              </a:xfrm>
+              <a:prstGeom prst="rect">
+                <a:avLst/>
+              </a:prstGeom>
+              <a:solidFill>
+                <a:schemeClr val="bg1"/>
+              </a:solidFill>
+              <a:ln>
+                <a:noFill/>
+              </a:ln>
+            </p:spPr>
+            <p:style>
+              <a:lnRef idx="2">
+                <a:schemeClr val="accent1">
+                  <a:shade val="50000"/>
+                </a:schemeClr>
+              </a:lnRef>
+              <a:fillRef idx="1">
+                <a:schemeClr val="accent1"/>
+              </a:fillRef>
+              <a:effectRef idx="0">
+                <a:schemeClr val="accent1"/>
+              </a:effectRef>
+              <a:fontRef idx="minor">
+                <a:schemeClr val="lt1"/>
+              </a:fontRef>
+            </p:style>
+            <p:txBody>
+              <a:bodyPr rtlCol="0" anchor="ctr"/>
+              <a:lstStyle/>
+              <a:p>
+                <a:pPr algn="ctr"/>
+                <a:endParaRPr lang="en-GB"/>
+              </a:p>
+            </p:txBody>
+          </p:sp>
+          <p:pic>
+            <p:nvPicPr>
+              <p:cNvPr id="2" name="Picture 1">
+                <a:extLst>
+                  <a:ext uri="{FF2B5EF4-FFF2-40B4-BE49-F238E27FC236}">
+                    <a16:creationId xmlns:a16="http://schemas.microsoft.com/office/drawing/2014/main" id="{7A31D563-336C-453E-87C2-4E1DDA28BB3D}"/>
+                  </a:ext>
+                </a:extLst>
+              </p:cNvPr>
+              <p:cNvPicPr>
+                <a:picLocks noChangeAspect="1"/>
+              </p:cNvPicPr>
+              <p:nvPr/>
+            </p:nvPicPr>
+            <p:blipFill>
+              <a:blip r:embed="rId2"/>
+              <a:stretch>
+                <a:fillRect/>
+              </a:stretch>
+            </p:blipFill>
+            <p:spPr>
+              <a:xfrm>
+                <a:off x="0" y="2370689"/>
+                <a:ext cx="12192000" cy="2116621"/>
+              </a:xfrm>
+              <a:prstGeom prst="rect">
+                <a:avLst/>
+              </a:prstGeom>
+            </p:spPr>
+          </p:pic>
+          <p:sp>
+            <p:nvSpPr>
+              <p:cNvPr id="5" name="Oval 4">
+                <a:extLst>
+                  <a:ext uri="{FF2B5EF4-FFF2-40B4-BE49-F238E27FC236}">
+                    <a16:creationId xmlns:a16="http://schemas.microsoft.com/office/drawing/2014/main" id="{A3D9B364-359A-4354-A561-BA600007B53D}"/>
+                  </a:ext>
+                </a:extLst>
+              </p:cNvPr>
+              <p:cNvSpPr/>
+              <p:nvPr/>
+            </p:nvSpPr>
+            <p:spPr>
+              <a:xfrm>
+                <a:off x="106260" y="926951"/>
+                <a:ext cx="2189526" cy="948981"/>
+              </a:xfrm>
+              <a:prstGeom prst="ellipse">
+                <a:avLst/>
+              </a:prstGeom>
+              <a:noFill/>
+              <a:ln>
+                <a:solidFill>
+                  <a:srgbClr val="FF0000"/>
+                </a:solidFill>
+              </a:ln>
+            </p:spPr>
+            <p:style>
+              <a:lnRef idx="2">
+                <a:schemeClr val="accent1">
+                  <a:shade val="50000"/>
+                </a:schemeClr>
+              </a:lnRef>
+              <a:fillRef idx="1">
+                <a:schemeClr val="accent1"/>
+              </a:fillRef>
+              <a:effectRef idx="0">
+                <a:schemeClr val="accent1"/>
+              </a:effectRef>
+              <a:fontRef idx="minor">
+                <a:schemeClr val="lt1"/>
+              </a:fontRef>
+            </p:style>
+            <p:txBody>
+              <a:bodyPr rtlCol="0" anchor="ctr"/>
+              <a:lstStyle/>
+              <a:p>
+                <a:pPr algn="ctr"/>
+                <a:r>
+                  <a:rPr lang="en-GB" sz="1600" dirty="0">
+                    <a:solidFill>
+                      <a:schemeClr val="tx1"/>
+                    </a:solidFill>
+                  </a:rPr>
+                  <a:t>Samples in this set. Click on a sample name for details</a:t>
+                </a:r>
+                <a:endParaRPr lang="en-GB" dirty="0">
+                  <a:solidFill>
+                    <a:schemeClr val="tx1"/>
+                  </a:solidFill>
+                </a:endParaRPr>
+              </a:p>
+            </p:txBody>
+          </p:sp>
+          <p:cxnSp>
+            <p:nvCxnSpPr>
+              <p:cNvPr id="6" name="Straight Arrow Connector 5">
+                <a:extLst>
+                  <a:ext uri="{FF2B5EF4-FFF2-40B4-BE49-F238E27FC236}">
+                    <a16:creationId xmlns:a16="http://schemas.microsoft.com/office/drawing/2014/main" id="{3DBEF6D9-BCF0-48FF-9CD6-D7B28FF73B59}"/>
+                  </a:ext>
+                </a:extLst>
+              </p:cNvPr>
+              <p:cNvCxnSpPr>
+                <a:cxnSpLocks/>
+                <a:stCxn id="5" idx="4"/>
+              </p:cNvCxnSpPr>
+              <p:nvPr/>
+            </p:nvCxnSpPr>
+            <p:spPr>
+              <a:xfrm flipH="1">
+                <a:off x="654341" y="1875932"/>
+                <a:ext cx="546682" cy="1455038"/>
+              </a:xfrm>
+              <a:prstGeom prst="straightConnector1">
+                <a:avLst/>
+              </a:prstGeom>
+              <a:ln w="12700">
+                <a:solidFill>
+                  <a:srgbClr val="FF0000"/>
+                </a:solidFill>
+                <a:tailEnd type="triangle"/>
+              </a:ln>
+            </p:spPr>
+            <p:style>
+              <a:lnRef idx="1">
+                <a:schemeClr val="accent1"/>
+              </a:lnRef>
+              <a:fillRef idx="0">
+                <a:schemeClr val="accent1"/>
+              </a:fillRef>
+              <a:effectRef idx="0">
+                <a:schemeClr val="accent1"/>
+              </a:effectRef>
+              <a:fontRef idx="minor">
+                <a:schemeClr val="tx1"/>
+              </a:fontRef>
+            </p:style>
+          </p:cxnSp>
+          <p:sp>
+            <p:nvSpPr>
+              <p:cNvPr id="8" name="Oval 7">
+                <a:extLst>
+                  <a:ext uri="{FF2B5EF4-FFF2-40B4-BE49-F238E27FC236}">
+                    <a16:creationId xmlns:a16="http://schemas.microsoft.com/office/drawing/2014/main" id="{D9A75C2D-EC3A-4B68-AD92-F7B01B85078A}"/>
+                  </a:ext>
+                </a:extLst>
+              </p:cNvPr>
+              <p:cNvSpPr/>
+              <p:nvPr/>
+            </p:nvSpPr>
+            <p:spPr>
+              <a:xfrm>
+                <a:off x="7235505" y="926951"/>
+                <a:ext cx="2189526" cy="948981"/>
+              </a:xfrm>
+              <a:prstGeom prst="ellipse">
+                <a:avLst/>
+              </a:prstGeom>
+              <a:noFill/>
+              <a:ln>
+                <a:solidFill>
+                  <a:srgbClr val="FF0000"/>
+                </a:solidFill>
+              </a:ln>
+            </p:spPr>
+            <p:style>
+              <a:lnRef idx="2">
+                <a:schemeClr val="accent1">
+                  <a:shade val="50000"/>
+                </a:schemeClr>
+              </a:lnRef>
+              <a:fillRef idx="1">
+                <a:schemeClr val="accent1"/>
+              </a:fillRef>
+              <a:effectRef idx="0">
+                <a:schemeClr val="accent1"/>
+              </a:effectRef>
+              <a:fontRef idx="minor">
+                <a:schemeClr val="lt1"/>
+              </a:fontRef>
+            </p:style>
+            <p:txBody>
+              <a:bodyPr rtlCol="0" anchor="ctr"/>
+              <a:lstStyle/>
+              <a:p>
+                <a:pPr algn="ctr"/>
+                <a:r>
+                  <a:rPr lang="en-GB" sz="1600" dirty="0">
+                    <a:solidFill>
+                      <a:schemeClr val="tx1"/>
+                    </a:solidFill>
+                  </a:rPr>
+                  <a:t>Filter or sort by any field</a:t>
+                </a:r>
+                <a:endParaRPr lang="en-GB" dirty="0">
+                  <a:solidFill>
+                    <a:schemeClr val="tx1"/>
+                  </a:solidFill>
+                </a:endParaRPr>
+              </a:p>
+            </p:txBody>
+          </p:sp>
+          <p:sp>
+            <p:nvSpPr>
+              <p:cNvPr id="13" name="Oval 12">
+                <a:extLst>
+                  <a:ext uri="{FF2B5EF4-FFF2-40B4-BE49-F238E27FC236}">
+                    <a16:creationId xmlns:a16="http://schemas.microsoft.com/office/drawing/2014/main" id="{623E3E2D-A841-4F20-8C28-E6AFF2012412}"/>
+                  </a:ext>
+                </a:extLst>
+              </p:cNvPr>
+              <p:cNvSpPr/>
+              <p:nvPr/>
+            </p:nvSpPr>
+            <p:spPr>
+              <a:xfrm>
+                <a:off x="9806732" y="974260"/>
+                <a:ext cx="2189526" cy="948981"/>
+              </a:xfrm>
+              <a:prstGeom prst="ellipse">
+                <a:avLst/>
+              </a:prstGeom>
+              <a:noFill/>
+              <a:ln>
+                <a:solidFill>
+                  <a:srgbClr val="FF0000"/>
+                </a:solidFill>
+              </a:ln>
+            </p:spPr>
+            <p:style>
+              <a:lnRef idx="2">
+                <a:schemeClr val="accent1">
+                  <a:shade val="50000"/>
+                </a:schemeClr>
+              </a:lnRef>
+              <a:fillRef idx="1">
+                <a:schemeClr val="accent1"/>
+              </a:fillRef>
+              <a:effectRef idx="0">
+                <a:schemeClr val="accent1"/>
+              </a:effectRef>
+              <a:fontRef idx="minor">
+                <a:schemeClr val="lt1"/>
+              </a:fontRef>
+            </p:style>
+            <p:txBody>
+              <a:bodyPr rtlCol="0" anchor="ctr"/>
+              <a:lstStyle/>
+              <a:p>
+                <a:pPr algn="ctr"/>
+                <a:r>
+                  <a:rPr lang="en-GB" sz="1600" dirty="0">
+                    <a:solidFill>
+                      <a:schemeClr val="tx1"/>
+                    </a:solidFill>
+                  </a:rPr>
+                  <a:t>Click for reports from underlying tools</a:t>
+                </a:r>
+                <a:endParaRPr lang="en-GB" dirty="0">
+                  <a:solidFill>
+                    <a:schemeClr val="tx1"/>
+                  </a:solidFill>
+                </a:endParaRPr>
+              </a:p>
+            </p:txBody>
+          </p:sp>
+          <p:cxnSp>
+            <p:nvCxnSpPr>
+              <p:cNvPr id="16" name="Straight Arrow Connector 15">
+                <a:extLst>
+                  <a:ext uri="{FF2B5EF4-FFF2-40B4-BE49-F238E27FC236}">
+                    <a16:creationId xmlns:a16="http://schemas.microsoft.com/office/drawing/2014/main" id="{B4AC610F-608A-4B48-B549-0C034F89C290}"/>
+                  </a:ext>
+                </a:extLst>
+              </p:cNvPr>
+              <p:cNvCxnSpPr>
+                <a:cxnSpLocks/>
+                <a:stCxn id="13" idx="4"/>
+              </p:cNvCxnSpPr>
+              <p:nvPr/>
+            </p:nvCxnSpPr>
+            <p:spPr>
+              <a:xfrm>
+                <a:off x="10901495" y="1923241"/>
+                <a:ext cx="163584" cy="1890893"/>
+              </a:xfrm>
+              <a:prstGeom prst="straightConnector1">
+                <a:avLst/>
+              </a:prstGeom>
+              <a:ln w="12700">
+                <a:solidFill>
+                  <a:srgbClr val="FF0000"/>
+                </a:solidFill>
+                <a:tailEnd type="triangle"/>
+              </a:ln>
+            </p:spPr>
+            <p:style>
+              <a:lnRef idx="1">
+                <a:schemeClr val="accent1"/>
+              </a:lnRef>
+              <a:fillRef idx="0">
+                <a:schemeClr val="accent1"/>
+              </a:fillRef>
+              <a:effectRef idx="0">
+                <a:schemeClr val="accent1"/>
+              </a:effectRef>
+              <a:fontRef idx="minor">
+                <a:schemeClr val="tx1"/>
+              </a:fontRef>
+            </p:style>
+          </p:cxnSp>
+          <p:cxnSp>
+            <p:nvCxnSpPr>
+              <p:cNvPr id="15" name="Straight Arrow Connector 14">
+                <a:extLst>
+                  <a:ext uri="{FF2B5EF4-FFF2-40B4-BE49-F238E27FC236}">
+                    <a16:creationId xmlns:a16="http://schemas.microsoft.com/office/drawing/2014/main" id="{35835E83-8565-4ECF-BCE7-CD0288C5C3FB}"/>
+                  </a:ext>
+                </a:extLst>
+              </p:cNvPr>
+              <p:cNvCxnSpPr>
+                <a:cxnSpLocks/>
+                <a:stCxn id="5" idx="4"/>
+              </p:cNvCxnSpPr>
+              <p:nvPr/>
+            </p:nvCxnSpPr>
+            <p:spPr>
+              <a:xfrm>
+                <a:off x="1201023" y="1875932"/>
+                <a:ext cx="1749104" cy="884046"/>
+              </a:xfrm>
+              <a:prstGeom prst="straightConnector1">
+                <a:avLst/>
+              </a:prstGeom>
+              <a:ln w="12700">
+                <a:solidFill>
+                  <a:srgbClr val="FF0000"/>
+                </a:solidFill>
+                <a:tailEnd type="triangle"/>
+              </a:ln>
+            </p:spPr>
+            <p:style>
+              <a:lnRef idx="1">
+                <a:schemeClr val="accent1"/>
+              </a:lnRef>
+              <a:fillRef idx="0">
+                <a:schemeClr val="accent1"/>
+              </a:fillRef>
+              <a:effectRef idx="0">
+                <a:schemeClr val="accent1"/>
+              </a:effectRef>
+              <a:fontRef idx="minor">
+                <a:schemeClr val="tx1"/>
+              </a:fontRef>
+            </p:style>
+          </p:cxnSp>
+          <p:cxnSp>
+            <p:nvCxnSpPr>
+              <p:cNvPr id="17" name="Straight Arrow Connector 16">
+                <a:extLst>
+                  <a:ext uri="{FF2B5EF4-FFF2-40B4-BE49-F238E27FC236}">
+                    <a16:creationId xmlns:a16="http://schemas.microsoft.com/office/drawing/2014/main" id="{330C94EB-8FB8-4D99-BFAB-B70658FBEF9D}"/>
+                  </a:ext>
+                </a:extLst>
+              </p:cNvPr>
+              <p:cNvCxnSpPr>
+                <a:cxnSpLocks/>
+                <a:stCxn id="8" idx="4"/>
+              </p:cNvCxnSpPr>
+              <p:nvPr/>
+            </p:nvCxnSpPr>
+            <p:spPr>
+              <a:xfrm flipH="1">
+                <a:off x="8252668" y="1875932"/>
+                <a:ext cx="77600" cy="1550479"/>
+              </a:xfrm>
+              <a:prstGeom prst="straightConnector1">
+                <a:avLst/>
+              </a:prstGeom>
+              <a:ln w="12700">
+                <a:solidFill>
+                  <a:srgbClr val="FF0000"/>
+                </a:solidFill>
+                <a:tailEnd type="triangle"/>
+              </a:ln>
+            </p:spPr>
+            <p:style>
+              <a:lnRef idx="1">
+                <a:schemeClr val="accent1"/>
+              </a:lnRef>
+              <a:fillRef idx="0">
+                <a:schemeClr val="accent1"/>
+              </a:fillRef>
+              <a:effectRef idx="0">
+                <a:schemeClr val="accent1"/>
+              </a:effectRef>
+              <a:fontRef idx="minor">
+                <a:schemeClr val="tx1"/>
+              </a:fontRef>
+            </p:style>
+          </p:cxnSp>
+          <p:sp>
+            <p:nvSpPr>
+              <p:cNvPr id="26" name="Oval 25">
+                <a:extLst>
+                  <a:ext uri="{FF2B5EF4-FFF2-40B4-BE49-F238E27FC236}">
+                    <a16:creationId xmlns:a16="http://schemas.microsoft.com/office/drawing/2014/main" id="{FB9B7086-79AA-4DC6-852D-5116027CD668}"/>
+                  </a:ext>
+                </a:extLst>
+              </p:cNvPr>
+              <p:cNvSpPr/>
+              <p:nvPr/>
+            </p:nvSpPr>
+            <p:spPr>
+              <a:xfrm>
+                <a:off x="2520892" y="926951"/>
+                <a:ext cx="2189526" cy="948981"/>
+              </a:xfrm>
+              <a:prstGeom prst="ellipse">
+                <a:avLst/>
+              </a:prstGeom>
+              <a:noFill/>
+              <a:ln>
+                <a:solidFill>
+                  <a:srgbClr val="FF0000"/>
+                </a:solidFill>
+              </a:ln>
+            </p:spPr>
+            <p:style>
+              <a:lnRef idx="2">
+                <a:schemeClr val="accent1">
+                  <a:shade val="50000"/>
+                </a:schemeClr>
+              </a:lnRef>
+              <a:fillRef idx="1">
+                <a:schemeClr val="accent1"/>
+              </a:fillRef>
+              <a:effectRef idx="0">
+                <a:schemeClr val="accent1"/>
+              </a:effectRef>
+              <a:fontRef idx="minor">
+                <a:schemeClr val="lt1"/>
+              </a:fontRef>
+            </p:style>
+            <p:txBody>
+              <a:bodyPr rtlCol="0" anchor="ctr"/>
+              <a:lstStyle/>
+              <a:p>
+                <a:pPr algn="ctr"/>
+                <a:r>
+                  <a:rPr lang="en-GB" sz="1600" dirty="0">
+                    <a:solidFill>
+                      <a:schemeClr val="tx1"/>
+                    </a:solidFill>
+                  </a:rPr>
+                  <a:t>Select columns to show. Drag to change order</a:t>
+                </a:r>
+                <a:endParaRPr lang="en-GB" dirty="0">
+                  <a:solidFill>
+                    <a:schemeClr val="tx1"/>
+                  </a:solidFill>
+                </a:endParaRPr>
+              </a:p>
+            </p:txBody>
+          </p:sp>
+          <p:cxnSp>
+            <p:nvCxnSpPr>
+              <p:cNvPr id="30" name="Straight Arrow Connector 29">
+                <a:extLst>
+                  <a:ext uri="{FF2B5EF4-FFF2-40B4-BE49-F238E27FC236}">
+                    <a16:creationId xmlns:a16="http://schemas.microsoft.com/office/drawing/2014/main" id="{3147EAD3-FB2D-464D-86BF-4A2BADEDCADD}"/>
+                  </a:ext>
+                </a:extLst>
+              </p:cNvPr>
+              <p:cNvCxnSpPr>
+                <a:cxnSpLocks/>
+                <a:stCxn id="26" idx="4"/>
+              </p:cNvCxnSpPr>
+              <p:nvPr/>
+            </p:nvCxnSpPr>
+            <p:spPr>
+              <a:xfrm flipH="1">
+                <a:off x="3347207" y="1875932"/>
+                <a:ext cx="268448" cy="1219607"/>
+              </a:xfrm>
+              <a:prstGeom prst="straightConnector1">
+                <a:avLst/>
+              </a:prstGeom>
+              <a:ln w="12700">
+                <a:solidFill>
+                  <a:srgbClr val="FF0000"/>
+                </a:solidFill>
+                <a:tailEnd type="triangle"/>
+              </a:ln>
+            </p:spPr>
+            <p:style>
+              <a:lnRef idx="1">
+                <a:schemeClr val="accent1"/>
+              </a:lnRef>
+              <a:fillRef idx="0">
+                <a:schemeClr val="accent1"/>
+              </a:fillRef>
+              <a:effectRef idx="0">
+                <a:schemeClr val="accent1"/>
+              </a:effectRef>
+              <a:fontRef idx="minor">
+                <a:schemeClr val="tx1"/>
+              </a:fontRef>
+            </p:style>
+          </p:cxnSp>
+          <p:sp>
+            <p:nvSpPr>
+              <p:cNvPr id="37" name="Rectangle 36">
+                <a:extLst>
+                  <a:ext uri="{FF2B5EF4-FFF2-40B4-BE49-F238E27FC236}">
+                    <a16:creationId xmlns:a16="http://schemas.microsoft.com/office/drawing/2014/main" id="{16B29095-0363-4A21-9B07-0B71EF94377F}"/>
+                  </a:ext>
+                </a:extLst>
+              </p:cNvPr>
+              <p:cNvSpPr/>
+              <p:nvPr/>
+            </p:nvSpPr>
+            <p:spPr>
+              <a:xfrm>
+                <a:off x="294317" y="4644128"/>
+                <a:ext cx="2147579" cy="1754326"/>
+              </a:xfrm>
+              <a:prstGeom prst="rect">
+                <a:avLst/>
+              </a:prstGeom>
+              <a:noFill/>
+              <a:ln w="12700">
+                <a:solidFill>
+                  <a:srgbClr val="FF0000"/>
+                </a:solidFill>
+              </a:ln>
+            </p:spPr>
+            <p:txBody>
+              <a:bodyPr wrap="square">
+                <a:spAutoFit/>
+              </a:bodyPr>
+              <a:lstStyle/>
+              <a:p>
+                <a:pPr algn="ctr"/>
+                <a:r>
+                  <a:rPr lang="en-GB" dirty="0"/>
+                  <a:t>Select a subset of genes on the Genes tab, then check this box for corresponding samples</a:t>
+                </a:r>
+              </a:p>
+            </p:txBody>
+          </p:sp>
+          <p:cxnSp>
+            <p:nvCxnSpPr>
+              <p:cNvPr id="38" name="Straight Arrow Connector 37">
+                <a:extLst>
+                  <a:ext uri="{FF2B5EF4-FFF2-40B4-BE49-F238E27FC236}">
+                    <a16:creationId xmlns:a16="http://schemas.microsoft.com/office/drawing/2014/main" id="{1B2C4018-E576-4397-8C48-7E954AB83B26}"/>
+                  </a:ext>
+                </a:extLst>
+              </p:cNvPr>
+              <p:cNvCxnSpPr>
+                <a:cxnSpLocks/>
+                <a:stCxn id="37" idx="0"/>
+              </p:cNvCxnSpPr>
+              <p:nvPr/>
+            </p:nvCxnSpPr>
+            <p:spPr>
+              <a:xfrm flipH="1" flipV="1">
+                <a:off x="213645" y="3207426"/>
+                <a:ext cx="1154462" cy="1436702"/>
+              </a:xfrm>
+              <a:prstGeom prst="straightConnector1">
+                <a:avLst/>
+              </a:prstGeom>
+              <a:ln w="12700">
+                <a:solidFill>
+                  <a:srgbClr val="FF0000"/>
+                </a:solidFill>
+                <a:tailEnd type="triangle"/>
+              </a:ln>
+            </p:spPr>
+            <p:style>
+              <a:lnRef idx="1">
+                <a:schemeClr val="accent1"/>
+              </a:lnRef>
+              <a:fillRef idx="0">
+                <a:schemeClr val="accent1"/>
+              </a:fillRef>
+              <a:effectRef idx="0">
+                <a:schemeClr val="accent1"/>
+              </a:effectRef>
+              <a:fontRef idx="minor">
+                <a:schemeClr val="tx1"/>
+              </a:fontRef>
+            </p:style>
+          </p:cxnSp>
+        </p:grpSp>
         <p:sp>
           <p:nvSpPr>
-            <p:cNvPr id="43" name="Rectangle 42">
+            <p:cNvPr id="7" name="Oval 6">
               <a:extLst>
                 <a:ext uri="{FF2B5EF4-FFF2-40B4-BE49-F238E27FC236}">
-                  <a16:creationId xmlns:a16="http://schemas.microsoft.com/office/drawing/2014/main" id="{24D5AF3C-098C-48B9-83EF-DDE073836C58}"/>
+                  <a16:creationId xmlns:a16="http://schemas.microsoft.com/office/drawing/2014/main" id="{C20523F6-5E67-48E9-BB6A-9EB832A38F41}"/>
                 </a:ext>
               </a:extLst>
             </p:cNvPr>
@@ -3382,89 +4052,7 @@
           </p:nvSpPr>
           <p:spPr>
             <a:xfrm>
-              <a:off x="0" y="637563"/>
-              <a:ext cx="12192000" cy="6098797"/>
-            </a:xfrm>
-            <a:prstGeom prst="rect">
-              <a:avLst/>
-            </a:prstGeom>
-            <a:solidFill>
-              <a:schemeClr val="bg1"/>
-            </a:solidFill>
-            <a:ln>
-              <a:noFill/>
-            </a:ln>
-          </p:spPr>
-          <p:style>
-            <a:lnRef idx="2">
-              <a:schemeClr val="accent1">
-                <a:shade val="50000"/>
-              </a:schemeClr>
-            </a:lnRef>
-            <a:fillRef idx="1">
-              <a:schemeClr val="accent1"/>
-            </a:fillRef>
-            <a:effectRef idx="0">
-              <a:schemeClr val="accent1"/>
-            </a:effectRef>
-            <a:fontRef idx="minor">
-              <a:schemeClr val="lt1"/>
-            </a:fontRef>
-          </p:style>
-          <p:txBody>
-            <a:bodyPr rtlCol="0" anchor="ctr"/>
-            <a:lstStyle/>
-            <a:p>
-              <a:pPr algn="ctr"/>
-              <a:endParaRPr lang="en-GB"/>
-            </a:p>
-          </p:txBody>
-        </p:sp>
-        <p:pic>
-          <p:nvPicPr>
-            <p:cNvPr id="2" name="Picture 1">
-              <a:extLst>
-                <a:ext uri="{FF2B5EF4-FFF2-40B4-BE49-F238E27FC236}">
-                  <a16:creationId xmlns:a16="http://schemas.microsoft.com/office/drawing/2014/main" id="{7A31D563-336C-453E-87C2-4E1DDA28BB3D}"/>
-                </a:ext>
-              </a:extLst>
-            </p:cNvPr>
-            <p:cNvPicPr>
-              <a:picLocks noChangeAspect="1"/>
-            </p:cNvPicPr>
-            <p:nvPr/>
-          </p:nvPicPr>
-          <p:blipFill>
-            <a:blip r:embed="rId2"/>
-            <a:stretch>
-              <a:fillRect/>
-            </a:stretch>
-          </p:blipFill>
-          <p:spPr>
-            <a:xfrm>
-              <a:off x="0" y="2370689"/>
-              <a:ext cx="12192000" cy="2116621"/>
-            </a:xfrm>
-            <a:prstGeom prst="rect">
-              <a:avLst/>
-            </a:prstGeom>
-          </p:spPr>
-        </p:pic>
-        <p:sp>
-          <p:nvSpPr>
-            <p:cNvPr id="5" name="Oval 4">
-              <a:extLst>
-                <a:ext uri="{FF2B5EF4-FFF2-40B4-BE49-F238E27FC236}">
-                  <a16:creationId xmlns:a16="http://schemas.microsoft.com/office/drawing/2014/main" id="{A3D9B364-359A-4354-A561-BA600007B53D}"/>
-                </a:ext>
-              </a:extLst>
-            </p:cNvPr>
-            <p:cNvSpPr/>
-            <p:nvPr/>
-          </p:nvSpPr>
-          <p:spPr>
-            <a:xfrm>
-              <a:off x="106260" y="926951"/>
+              <a:off x="5018714" y="851448"/>
               <a:ext cx="2189526" cy="948981"/>
             </a:xfrm>
             <a:prstGeom prst="ellipse">
@@ -3504,7 +4092,7 @@
                     <a:schemeClr val="tx1"/>
                   </a:solidFill>
                 </a:rPr>
-                <a:t>Samples in this set. Click on a sample name for details</a:t>
+                <a:t>Change column width by dragging divider</a:t>
               </a:r>
               <a:endParaRPr lang="en-GB" dirty="0">
                 <a:solidFill>
@@ -3516,481 +4104,22 @@
         </p:sp>
         <p:cxnSp>
           <p:nvCxnSpPr>
-            <p:cNvPr id="6" name="Straight Arrow Connector 5">
+            <p:cNvPr id="22" name="Straight Arrow Connector 21">
               <a:extLst>
                 <a:ext uri="{FF2B5EF4-FFF2-40B4-BE49-F238E27FC236}">
-                  <a16:creationId xmlns:a16="http://schemas.microsoft.com/office/drawing/2014/main" id="{3DBEF6D9-BCF0-48FF-9CD6-D7B28FF73B59}"/>
+                  <a16:creationId xmlns:a16="http://schemas.microsoft.com/office/drawing/2014/main" id="{669896C5-B669-408A-A579-55C18BF11B40}"/>
                 </a:ext>
               </a:extLst>
             </p:cNvPr>
             <p:cNvCxnSpPr>
               <a:cxnSpLocks/>
-              <a:stCxn id="5" idx="4"/>
             </p:cNvCxnSpPr>
             <p:nvPr/>
           </p:nvCxnSpPr>
           <p:spPr>
             <a:xfrm flipH="1">
-              <a:off x="654341" y="1875932"/>
-              <a:ext cx="546682" cy="1455038"/>
-            </a:xfrm>
-            <a:prstGeom prst="straightConnector1">
-              <a:avLst/>
-            </a:prstGeom>
-            <a:ln w="12700">
-              <a:solidFill>
-                <a:srgbClr val="FF0000"/>
-              </a:solidFill>
-              <a:tailEnd type="triangle"/>
-            </a:ln>
-          </p:spPr>
-          <p:style>
-            <a:lnRef idx="1">
-              <a:schemeClr val="accent1"/>
-            </a:lnRef>
-            <a:fillRef idx="0">
-              <a:schemeClr val="accent1"/>
-            </a:fillRef>
-            <a:effectRef idx="0">
-              <a:schemeClr val="accent1"/>
-            </a:effectRef>
-            <a:fontRef idx="minor">
-              <a:schemeClr val="tx1"/>
-            </a:fontRef>
-          </p:style>
-        </p:cxnSp>
-        <p:sp>
-          <p:nvSpPr>
-            <p:cNvPr id="8" name="Oval 7">
-              <a:extLst>
-                <a:ext uri="{FF2B5EF4-FFF2-40B4-BE49-F238E27FC236}">
-                  <a16:creationId xmlns:a16="http://schemas.microsoft.com/office/drawing/2014/main" id="{D9A75C2D-EC3A-4B68-AD92-F7B01B85078A}"/>
-                </a:ext>
-              </a:extLst>
-            </p:cNvPr>
-            <p:cNvSpPr/>
-            <p:nvPr/>
-          </p:nvSpPr>
-          <p:spPr>
-            <a:xfrm>
-              <a:off x="6295940" y="940462"/>
-              <a:ext cx="2189526" cy="948981"/>
-            </a:xfrm>
-            <a:prstGeom prst="ellipse">
-              <a:avLst/>
-            </a:prstGeom>
-            <a:noFill/>
-            <a:ln>
-              <a:solidFill>
-                <a:srgbClr val="FF0000"/>
-              </a:solidFill>
-            </a:ln>
-          </p:spPr>
-          <p:style>
-            <a:lnRef idx="2">
-              <a:schemeClr val="accent1">
-                <a:shade val="50000"/>
-              </a:schemeClr>
-            </a:lnRef>
-            <a:fillRef idx="1">
-              <a:schemeClr val="accent1"/>
-            </a:fillRef>
-            <a:effectRef idx="0">
-              <a:schemeClr val="accent1"/>
-            </a:effectRef>
-            <a:fontRef idx="minor">
-              <a:schemeClr val="lt1"/>
-            </a:fontRef>
-          </p:style>
-          <p:txBody>
-            <a:bodyPr rtlCol="0" anchor="ctr"/>
-            <a:lstStyle/>
-            <a:p>
-              <a:pPr algn="ctr"/>
-              <a:r>
-                <a:rPr lang="en-GB" sz="1600" dirty="0">
-                  <a:solidFill>
-                    <a:schemeClr val="tx1"/>
-                  </a:solidFill>
-                </a:rPr>
-                <a:t>Filter or sort by any field</a:t>
-              </a:r>
-              <a:endParaRPr lang="en-GB" dirty="0">
-                <a:solidFill>
-                  <a:schemeClr val="tx1"/>
-                </a:solidFill>
-              </a:endParaRPr>
-            </a:p>
-          </p:txBody>
-        </p:sp>
-        <p:sp>
-          <p:nvSpPr>
-            <p:cNvPr id="13" name="Oval 12">
-              <a:extLst>
-                <a:ext uri="{FF2B5EF4-FFF2-40B4-BE49-F238E27FC236}">
-                  <a16:creationId xmlns:a16="http://schemas.microsoft.com/office/drawing/2014/main" id="{623E3E2D-A841-4F20-8C28-E6AFF2012412}"/>
-                </a:ext>
-              </a:extLst>
-            </p:cNvPr>
-            <p:cNvSpPr/>
-            <p:nvPr/>
-          </p:nvSpPr>
-          <p:spPr>
-            <a:xfrm>
-              <a:off x="9806732" y="974260"/>
-              <a:ext cx="2189526" cy="948981"/>
-            </a:xfrm>
-            <a:prstGeom prst="ellipse">
-              <a:avLst/>
-            </a:prstGeom>
-            <a:noFill/>
-            <a:ln>
-              <a:solidFill>
-                <a:srgbClr val="FF0000"/>
-              </a:solidFill>
-            </a:ln>
-          </p:spPr>
-          <p:style>
-            <a:lnRef idx="2">
-              <a:schemeClr val="accent1">
-                <a:shade val="50000"/>
-              </a:schemeClr>
-            </a:lnRef>
-            <a:fillRef idx="1">
-              <a:schemeClr val="accent1"/>
-            </a:fillRef>
-            <a:effectRef idx="0">
-              <a:schemeClr val="accent1"/>
-            </a:effectRef>
-            <a:fontRef idx="minor">
-              <a:schemeClr val="lt1"/>
-            </a:fontRef>
-          </p:style>
-          <p:txBody>
-            <a:bodyPr rtlCol="0" anchor="ctr"/>
-            <a:lstStyle/>
-            <a:p>
-              <a:pPr algn="ctr"/>
-              <a:r>
-                <a:rPr lang="en-GB" sz="1600" dirty="0">
-                  <a:solidFill>
-                    <a:schemeClr val="tx1"/>
-                  </a:solidFill>
-                </a:rPr>
-                <a:t>Click for reports from underlying tools</a:t>
-              </a:r>
-              <a:endParaRPr lang="en-GB" dirty="0">
-                <a:solidFill>
-                  <a:schemeClr val="tx1"/>
-                </a:solidFill>
-              </a:endParaRPr>
-            </a:p>
-          </p:txBody>
-        </p:sp>
-        <p:cxnSp>
-          <p:nvCxnSpPr>
-            <p:cNvPr id="16" name="Straight Arrow Connector 15">
-              <a:extLst>
-                <a:ext uri="{FF2B5EF4-FFF2-40B4-BE49-F238E27FC236}">
-                  <a16:creationId xmlns:a16="http://schemas.microsoft.com/office/drawing/2014/main" id="{B4AC610F-608A-4B48-B549-0C034F89C290}"/>
-                </a:ext>
-              </a:extLst>
-            </p:cNvPr>
-            <p:cNvCxnSpPr>
-              <a:cxnSpLocks/>
-              <a:stCxn id="13" idx="4"/>
-            </p:cNvCxnSpPr>
-            <p:nvPr/>
-          </p:nvCxnSpPr>
-          <p:spPr>
-            <a:xfrm>
-              <a:off x="10901495" y="1923241"/>
-              <a:ext cx="160089" cy="1503170"/>
-            </a:xfrm>
-            <a:prstGeom prst="straightConnector1">
-              <a:avLst/>
-            </a:prstGeom>
-            <a:ln w="12700">
-              <a:solidFill>
-                <a:srgbClr val="FF0000"/>
-              </a:solidFill>
-              <a:tailEnd type="triangle"/>
-            </a:ln>
-          </p:spPr>
-          <p:style>
-            <a:lnRef idx="1">
-              <a:schemeClr val="accent1"/>
-            </a:lnRef>
-            <a:fillRef idx="0">
-              <a:schemeClr val="accent1"/>
-            </a:fillRef>
-            <a:effectRef idx="0">
-              <a:schemeClr val="accent1"/>
-            </a:effectRef>
-            <a:fontRef idx="minor">
-              <a:schemeClr val="tx1"/>
-            </a:fontRef>
-          </p:style>
-        </p:cxnSp>
-        <p:cxnSp>
-          <p:nvCxnSpPr>
-            <p:cNvPr id="15" name="Straight Arrow Connector 14">
-              <a:extLst>
-                <a:ext uri="{FF2B5EF4-FFF2-40B4-BE49-F238E27FC236}">
-                  <a16:creationId xmlns:a16="http://schemas.microsoft.com/office/drawing/2014/main" id="{35835E83-8565-4ECF-BCE7-CD0288C5C3FB}"/>
-                </a:ext>
-              </a:extLst>
-            </p:cNvPr>
-            <p:cNvCxnSpPr>
-              <a:cxnSpLocks/>
-              <a:stCxn id="5" idx="4"/>
-            </p:cNvCxnSpPr>
-            <p:nvPr/>
-          </p:nvCxnSpPr>
-          <p:spPr>
-            <a:xfrm>
-              <a:off x="1201023" y="1875932"/>
-              <a:ext cx="1749104" cy="884046"/>
-            </a:xfrm>
-            <a:prstGeom prst="straightConnector1">
-              <a:avLst/>
-            </a:prstGeom>
-            <a:ln w="12700">
-              <a:solidFill>
-                <a:srgbClr val="FF0000"/>
-              </a:solidFill>
-              <a:tailEnd type="triangle"/>
-            </a:ln>
-          </p:spPr>
-          <p:style>
-            <a:lnRef idx="1">
-              <a:schemeClr val="accent1"/>
-            </a:lnRef>
-            <a:fillRef idx="0">
-              <a:schemeClr val="accent1"/>
-            </a:fillRef>
-            <a:effectRef idx="0">
-              <a:schemeClr val="accent1"/>
-            </a:effectRef>
-            <a:fontRef idx="minor">
-              <a:schemeClr val="tx1"/>
-            </a:fontRef>
-          </p:style>
-        </p:cxnSp>
-        <p:cxnSp>
-          <p:nvCxnSpPr>
-            <p:cNvPr id="17" name="Straight Arrow Connector 16">
-              <a:extLst>
-                <a:ext uri="{FF2B5EF4-FFF2-40B4-BE49-F238E27FC236}">
-                  <a16:creationId xmlns:a16="http://schemas.microsoft.com/office/drawing/2014/main" id="{330C94EB-8FB8-4D99-BFAB-B70658FBEF9D}"/>
-                </a:ext>
-              </a:extLst>
-            </p:cNvPr>
-            <p:cNvCxnSpPr>
-              <a:cxnSpLocks/>
-              <a:stCxn id="8" idx="4"/>
-            </p:cNvCxnSpPr>
-            <p:nvPr/>
-          </p:nvCxnSpPr>
-          <p:spPr>
-            <a:xfrm>
-              <a:off x="7390703" y="1889443"/>
-              <a:ext cx="659933" cy="1536968"/>
-            </a:xfrm>
-            <a:prstGeom prst="straightConnector1">
-              <a:avLst/>
-            </a:prstGeom>
-            <a:ln w="12700">
-              <a:solidFill>
-                <a:srgbClr val="FF0000"/>
-              </a:solidFill>
-              <a:tailEnd type="triangle"/>
-            </a:ln>
-          </p:spPr>
-          <p:style>
-            <a:lnRef idx="1">
-              <a:schemeClr val="accent1"/>
-            </a:lnRef>
-            <a:fillRef idx="0">
-              <a:schemeClr val="accent1"/>
-            </a:fillRef>
-            <a:effectRef idx="0">
-              <a:schemeClr val="accent1"/>
-            </a:effectRef>
-            <a:fontRef idx="minor">
-              <a:schemeClr val="tx1"/>
-            </a:fontRef>
-          </p:style>
-        </p:cxnSp>
-        <p:sp>
-          <p:nvSpPr>
-            <p:cNvPr id="26" name="Oval 25">
-              <a:extLst>
-                <a:ext uri="{FF2B5EF4-FFF2-40B4-BE49-F238E27FC236}">
-                  <a16:creationId xmlns:a16="http://schemas.microsoft.com/office/drawing/2014/main" id="{FB9B7086-79AA-4DC6-852D-5116027CD668}"/>
-                </a:ext>
-              </a:extLst>
-            </p:cNvPr>
-            <p:cNvSpPr/>
-            <p:nvPr/>
-          </p:nvSpPr>
-          <p:spPr>
-            <a:xfrm>
-              <a:off x="2844571" y="944209"/>
-              <a:ext cx="2189526" cy="948981"/>
-            </a:xfrm>
-            <a:prstGeom prst="ellipse">
-              <a:avLst/>
-            </a:prstGeom>
-            <a:noFill/>
-            <a:ln>
-              <a:solidFill>
-                <a:srgbClr val="FF0000"/>
-              </a:solidFill>
-            </a:ln>
-          </p:spPr>
-          <p:style>
-            <a:lnRef idx="2">
-              <a:schemeClr val="accent1">
-                <a:shade val="50000"/>
-              </a:schemeClr>
-            </a:lnRef>
-            <a:fillRef idx="1">
-              <a:schemeClr val="accent1"/>
-            </a:fillRef>
-            <a:effectRef idx="0">
-              <a:schemeClr val="accent1"/>
-            </a:effectRef>
-            <a:fontRef idx="minor">
-              <a:schemeClr val="lt1"/>
-            </a:fontRef>
-          </p:style>
-          <p:txBody>
-            <a:bodyPr rtlCol="0" anchor="ctr"/>
-            <a:lstStyle/>
-            <a:p>
-              <a:pPr algn="ctr"/>
-              <a:r>
-                <a:rPr lang="en-GB" sz="1600" dirty="0">
-                  <a:solidFill>
-                    <a:schemeClr val="tx1"/>
-                  </a:solidFill>
-                </a:rPr>
-                <a:t>Select columns to show. Drag to change order</a:t>
-              </a:r>
-              <a:endParaRPr lang="en-GB" dirty="0">
-                <a:solidFill>
-                  <a:schemeClr val="tx1"/>
-                </a:solidFill>
-              </a:endParaRPr>
-            </a:p>
-          </p:txBody>
-        </p:sp>
-        <p:cxnSp>
-          <p:nvCxnSpPr>
-            <p:cNvPr id="30" name="Straight Arrow Connector 29">
-              <a:extLst>
-                <a:ext uri="{FF2B5EF4-FFF2-40B4-BE49-F238E27FC236}">
-                  <a16:creationId xmlns:a16="http://schemas.microsoft.com/office/drawing/2014/main" id="{3147EAD3-FB2D-464D-86BF-4A2BADEDCADD}"/>
-                </a:ext>
-              </a:extLst>
-            </p:cNvPr>
-            <p:cNvCxnSpPr>
-              <a:cxnSpLocks/>
-              <a:stCxn id="26" idx="4"/>
-            </p:cNvCxnSpPr>
-            <p:nvPr/>
-          </p:nvCxnSpPr>
-          <p:spPr>
-            <a:xfrm flipH="1">
-              <a:off x="3691857" y="1893190"/>
-              <a:ext cx="247477" cy="1150357"/>
-            </a:xfrm>
-            <a:prstGeom prst="straightConnector1">
-              <a:avLst/>
-            </a:prstGeom>
-            <a:ln w="12700">
-              <a:solidFill>
-                <a:srgbClr val="FF0000"/>
-              </a:solidFill>
-              <a:tailEnd type="triangle"/>
-            </a:ln>
-          </p:spPr>
-          <p:style>
-            <a:lnRef idx="1">
-              <a:schemeClr val="accent1"/>
-            </a:lnRef>
-            <a:fillRef idx="0">
-              <a:schemeClr val="accent1"/>
-            </a:fillRef>
-            <a:effectRef idx="0">
-              <a:schemeClr val="accent1"/>
-            </a:effectRef>
-            <a:fontRef idx="minor">
-              <a:schemeClr val="tx1"/>
-            </a:fontRef>
-          </p:style>
-        </p:cxnSp>
-        <p:sp>
-          <p:nvSpPr>
-            <p:cNvPr id="37" name="Rectangle 36">
-              <a:extLst>
-                <a:ext uri="{FF2B5EF4-FFF2-40B4-BE49-F238E27FC236}">
-                  <a16:creationId xmlns:a16="http://schemas.microsoft.com/office/drawing/2014/main" id="{16B29095-0363-4A21-9B07-0B71EF94377F}"/>
-                </a:ext>
-              </a:extLst>
-            </p:cNvPr>
-            <p:cNvSpPr/>
-            <p:nvPr/>
-          </p:nvSpPr>
-          <p:spPr>
-            <a:xfrm>
-              <a:off x="294317" y="4644128"/>
-              <a:ext cx="2147579" cy="1754326"/>
-            </a:xfrm>
-            <a:prstGeom prst="rect">
-              <a:avLst/>
-            </a:prstGeom>
-            <a:noFill/>
-            <a:ln w="12700">
-              <a:solidFill>
-                <a:srgbClr val="FF0000"/>
-              </a:solidFill>
-            </a:ln>
-          </p:spPr>
-          <p:txBody>
-            <a:bodyPr wrap="square">
-              <a:spAutoFit/>
-            </a:bodyPr>
-            <a:lstStyle/>
-            <a:p>
-              <a:pPr algn="ctr"/>
-              <a:r>
-                <a:rPr lang="en-GB" dirty="0"/>
-                <a:t>Select a subset of genes on the Genes tab, then check this box for corresponding samples</a:t>
-              </a:r>
-            </a:p>
-          </p:txBody>
-        </p:sp>
-        <p:cxnSp>
-          <p:nvCxnSpPr>
-            <p:cNvPr id="38" name="Straight Arrow Connector 37">
-              <a:extLst>
-                <a:ext uri="{FF2B5EF4-FFF2-40B4-BE49-F238E27FC236}">
-                  <a16:creationId xmlns:a16="http://schemas.microsoft.com/office/drawing/2014/main" id="{1B2C4018-E576-4397-8C48-7E954AB83B26}"/>
-                </a:ext>
-              </a:extLst>
-            </p:cNvPr>
-            <p:cNvCxnSpPr>
-              <a:cxnSpLocks/>
-              <a:stCxn id="37" idx="0"/>
-            </p:cNvCxnSpPr>
-            <p:nvPr/>
-          </p:nvCxnSpPr>
-          <p:spPr>
-            <a:xfrm flipH="1" flipV="1">
-              <a:off x="213645" y="3207426"/>
-              <a:ext cx="1154462" cy="1436702"/>
+              <a:off x="5673055" y="1794632"/>
+              <a:ext cx="471880" cy="1738923"/>
             </a:xfrm>
             <a:prstGeom prst="straightConnector1">
               <a:avLst/>

</xml_diff>